<commit_message>
Added PDF synthetic data example files and updated 4 domain pages. Updated pipeline graphic on home page
</commit_message>
<xml_diff>
--- a/input/images-source/FHIR_Data_Pipeline_PQ_Industry.pptx
+++ b/input/images-source/FHIR_Data_Pipeline_PQ_Industry.pptx
@@ -8,7 +8,7 @@
     <p:notesMasterId r:id="rId3"/>
   </p:notesMasterIdLst>
   <p:sldIdLst>
-    <p:sldId id="257" r:id="rId2"/>
+    <p:sldId id="258" r:id="rId2"/>
   </p:sldIdLst>
   <p:sldSz cx="12192000" cy="6858000"/>
   <p:notesSz cx="6858000" cy="9144000"/>
@@ -107,6 +107,11 @@
       </a:defRPr>
     </a:lvl9pPr>
   </p:defaultTextStyle>
+  <p:extLst>
+    <p:ext uri="{EFAFB233-063F-42B5-8137-9DF3F51BA10A}">
+      <p15:sldGuideLst xmlns:p15="http://schemas.microsoft.com/office/powerpoint/2012/main"/>
+    </p:ext>
+  </p:extLst>
 </p:presentation>
 </file>
 
@@ -159,7 +164,7 @@
             </a:lvl1pPr>
           </a:lstStyle>
           <a:p>
-            <a:endParaRPr lang="en-US"/>
+            <a:endParaRPr lang="en-US" dirty="0"/>
           </a:p>
         </p:txBody>
       </p:sp>
@@ -192,9 +197,9 @@
           <a:p>
             <a:fld id="{77D99530-AAB0-4A07-826F-3C794BC63EAF}" type="datetimeFigureOut">
               <a:rPr lang="en-US" smtClean="0"/>
-              <a:t>11/15/2023</a:t>
+              <a:t>11/16/2023</a:t>
             </a:fld>
-            <a:endParaRPr lang="en-US"/>
+            <a:endParaRPr lang="en-US" dirty="0"/>
           </a:p>
         </p:txBody>
       </p:sp>
@@ -227,7 +232,7 @@
           <a:bodyPr vert="horz" lIns="91440" tIns="45720" rIns="91440" bIns="45720" rtlCol="0" anchor="ctr"/>
           <a:lstStyle/>
           <a:p>
-            <a:endParaRPr lang="en-US"/>
+            <a:endParaRPr lang="en-US" dirty="0"/>
           </a:p>
         </p:txBody>
       </p:sp>
@@ -317,7 +322,7 @@
             </a:lvl1pPr>
           </a:lstStyle>
           <a:p>
-            <a:endParaRPr lang="en-US"/>
+            <a:endParaRPr lang="en-US" dirty="0"/>
           </a:p>
         </p:txBody>
       </p:sp>
@@ -352,7 +357,7 @@
               <a:rPr lang="en-US" smtClean="0"/>
               <a:t>‹#›</a:t>
             </a:fld>
-            <a:endParaRPr lang="en-US"/>
+            <a:endParaRPr lang="en-US" dirty="0"/>
           </a:p>
         </p:txBody>
       </p:sp>
@@ -551,7 +556,7 @@
 
 <file path=ppt/slideLayouts/slideLayout1.xml><?xml version="1.0" encoding="utf-8"?>
 <p:sldLayout xmlns:a="http://schemas.openxmlformats.org/drawingml/2006/main" xmlns:r="http://schemas.openxmlformats.org/officeDocument/2006/relationships" xmlns:p="http://schemas.openxmlformats.org/presentationml/2006/main" preserve="1" userDrawn="1">
-  <p:cSld name="Title Only">
+  <p:cSld name="Title and blank">
     <p:spTree>
       <p:nvGrpSpPr>
         <p:cNvPr id="1" name=""/>
@@ -1173,66 +1178,6 @@
           <a:chExt cx="0" cy="0"/>
         </a:xfrm>
       </p:grpSpPr>
-      <p:pic>
-        <p:nvPicPr>
-          <p:cNvPr id="2064" name="Picture 2063">
-            <a:extLst>
-              <a:ext uri="{FF2B5EF4-FFF2-40B4-BE49-F238E27FC236}">
-                <a16:creationId xmlns:a16="http://schemas.microsoft.com/office/drawing/2014/main" id="{D822B057-C559-7182-BD19-E8F034F2607D}"/>
-              </a:ext>
-            </a:extLst>
-          </p:cNvPr>
-          <p:cNvPicPr>
-            <a:picLocks noChangeAspect="1"/>
-          </p:cNvPicPr>
-          <p:nvPr/>
-        </p:nvPicPr>
-        <p:blipFill>
-          <a:blip r:embed="rId3"/>
-          <a:stretch>
-            <a:fillRect/>
-          </a:stretch>
-        </p:blipFill>
-        <p:spPr>
-          <a:xfrm>
-            <a:off x="9477395" y="4319701"/>
-            <a:ext cx="448056" cy="565670"/>
-          </a:xfrm>
-          <a:prstGeom prst="rect">
-            <a:avLst/>
-          </a:prstGeom>
-        </p:spPr>
-      </p:pic>
-      <p:pic>
-        <p:nvPicPr>
-          <p:cNvPr id="2065" name="Picture 2064">
-            <a:extLst>
-              <a:ext uri="{FF2B5EF4-FFF2-40B4-BE49-F238E27FC236}">
-                <a16:creationId xmlns:a16="http://schemas.microsoft.com/office/drawing/2014/main" id="{741F2C39-6BEC-BDCA-436F-A0AE6EB536BF}"/>
-              </a:ext>
-            </a:extLst>
-          </p:cNvPr>
-          <p:cNvPicPr>
-            <a:picLocks noChangeAspect="1"/>
-          </p:cNvPicPr>
-          <p:nvPr/>
-        </p:nvPicPr>
-        <p:blipFill>
-          <a:blip r:embed="rId3"/>
-          <a:stretch>
-            <a:fillRect/>
-          </a:stretch>
-        </p:blipFill>
-        <p:spPr>
-          <a:xfrm>
-            <a:off x="9477395" y="5270050"/>
-            <a:ext cx="448056" cy="565670"/>
-          </a:xfrm>
-          <a:prstGeom prst="rect">
-            <a:avLst/>
-          </a:prstGeom>
-        </p:spPr>
-      </p:pic>
       <p:graphicFrame>
         <p:nvGraphicFramePr>
           <p:cNvPr id="3" name="Table 3">
@@ -1248,8 +1193,8 @@
           <p:nvPr/>
         </p:nvGraphicFramePr>
         <p:xfrm>
-          <a:off x="541338" y="1054623"/>
-          <a:ext cx="11163300" cy="4946476"/>
+          <a:off x="430177" y="1052079"/>
+          <a:ext cx="11408496" cy="4927962"/>
         </p:xfrm>
         <a:graphic>
           <a:graphicData uri="http://schemas.openxmlformats.org/drawingml/2006/table">
@@ -1258,35 +1203,35 @@
                 <a:tableStyleId>{2D5ABB26-0587-4C30-8999-92F81FD0307C}</a:tableStyleId>
               </a:tblPr>
               <a:tblGrid>
-                <a:gridCol w="1625600">
+                <a:gridCol w="1702755">
                   <a:extLst>
                     <a:ext uri="{9D8B030D-6E8A-4147-A177-3AD203B41FA5}">
                       <a16:colId xmlns:a16="http://schemas.microsoft.com/office/drawing/2014/main" val="1780153100"/>
                     </a:ext>
                   </a:extLst>
                 </a:gridCol>
-                <a:gridCol w="5283200">
+                <a:gridCol w="5283199">
                   <a:extLst>
                     <a:ext uri="{9D8B030D-6E8A-4147-A177-3AD203B41FA5}">
                       <a16:colId xmlns:a16="http://schemas.microsoft.com/office/drawing/2014/main" val="939129571"/>
                     </a:ext>
                   </a:extLst>
                 </a:gridCol>
-                <a:gridCol w="1449436">
+                <a:gridCol w="1449435">
                   <a:extLst>
                     <a:ext uri="{9D8B030D-6E8A-4147-A177-3AD203B41FA5}">
                       <a16:colId xmlns:a16="http://schemas.microsoft.com/office/drawing/2014/main" val="1521947778"/>
                     </a:ext>
                   </a:extLst>
                 </a:gridCol>
-                <a:gridCol w="1281064">
+                <a:gridCol w="1281061">
                   <a:extLst>
                     <a:ext uri="{9D8B030D-6E8A-4147-A177-3AD203B41FA5}">
                       <a16:colId xmlns:a16="http://schemas.microsoft.com/office/drawing/2014/main" val="622583136"/>
                     </a:ext>
                   </a:extLst>
                 </a:gridCol>
-                <a:gridCol w="1524000">
+                <a:gridCol w="1692046">
                   <a:extLst>
                     <a:ext uri="{9D8B030D-6E8A-4147-A177-3AD203B41FA5}">
                       <a16:colId xmlns:a16="http://schemas.microsoft.com/office/drawing/2014/main" val="2612278353"/>
@@ -3094,10 +3039,10 @@
       </p:graphicFrame>
       <p:pic>
         <p:nvPicPr>
-          <p:cNvPr id="2063" name="Picture 2062">
+          <p:cNvPr id="2065" name="Picture 2064">
             <a:extLst>
               <a:ext uri="{FF2B5EF4-FFF2-40B4-BE49-F238E27FC236}">
-                <a16:creationId xmlns:a16="http://schemas.microsoft.com/office/drawing/2014/main" id="{DFCF50DC-6FA5-C691-E298-756949716D2B}"/>
+                <a16:creationId xmlns:a16="http://schemas.microsoft.com/office/drawing/2014/main" id="{741F2C39-6BEC-BDCA-436F-A0AE6EB536BF}"/>
               </a:ext>
             </a:extLst>
           </p:cNvPr>
@@ -3114,7 +3059,7 @@
         </p:blipFill>
         <p:spPr>
           <a:xfrm>
-            <a:off x="9414567" y="3343348"/>
+            <a:off x="9264819" y="5131214"/>
             <a:ext cx="448056" cy="565670"/>
           </a:xfrm>
           <a:prstGeom prst="rect">
@@ -3138,12 +3083,7 @@
             <p:ph type="title"/>
           </p:nvPr>
         </p:nvSpPr>
-        <p:spPr>
-          <a:xfrm>
-            <a:off x="448386" y="484632"/>
-            <a:ext cx="11292840" cy="408558"/>
-          </a:xfrm>
-        </p:spPr>
+        <p:spPr/>
         <p:txBody>
           <a:bodyPr/>
           <a:lstStyle/>
@@ -4120,7 +4060,7 @@
         </p:blipFill>
         <p:spPr bwMode="auto">
           <a:xfrm>
-            <a:off x="7956262" y="2433960"/>
+            <a:off x="7956262" y="2351410"/>
             <a:ext cx="433984" cy="411794"/>
           </a:xfrm>
           <a:prstGeom prst="rect">
@@ -4165,7 +4105,7 @@
         </p:blipFill>
         <p:spPr bwMode="auto">
           <a:xfrm>
-            <a:off x="7956262" y="3267737"/>
+            <a:off x="7956262" y="3337587"/>
             <a:ext cx="433984" cy="411794"/>
           </a:xfrm>
           <a:prstGeom prst="rect">
@@ -4354,7 +4294,7 @@
         </p:nvSpPr>
         <p:spPr bwMode="gray">
           <a:xfrm>
-            <a:off x="6167381" y="2272339"/>
+            <a:off x="6167381" y="2189789"/>
             <a:ext cx="1121367" cy="750695"/>
           </a:xfrm>
           <a:prstGeom prst="rect">
@@ -4421,7 +4361,7 @@
         </p:nvSpPr>
         <p:spPr bwMode="gray">
           <a:xfrm>
-            <a:off x="6161667" y="3105113"/>
+            <a:off x="6161667" y="3174963"/>
             <a:ext cx="1121367" cy="750695"/>
           </a:xfrm>
           <a:prstGeom prst="rect">
@@ -4626,7 +4566,7 @@
         </p:nvCxnSpPr>
         <p:spPr bwMode="gray">
           <a:xfrm flipV="1">
-            <a:off x="7288748" y="2639858"/>
+            <a:off x="7288748" y="2557308"/>
             <a:ext cx="667515" cy="7829"/>
           </a:xfrm>
           <a:prstGeom prst="straightConnector1">
@@ -4665,7 +4605,7 @@
         </p:nvCxnSpPr>
         <p:spPr bwMode="gray">
           <a:xfrm flipV="1">
-            <a:off x="7283034" y="3473634"/>
+            <a:off x="7283034" y="3543484"/>
             <a:ext cx="673229" cy="6826"/>
           </a:xfrm>
           <a:prstGeom prst="straightConnector1">
@@ -4791,7 +4731,7 @@
         </p:blipFill>
         <p:spPr bwMode="auto">
           <a:xfrm>
-            <a:off x="9248838" y="2346717"/>
+            <a:off x="9248838" y="2264167"/>
             <a:ext cx="444674" cy="586283"/>
           </a:xfrm>
           <a:prstGeom prst="rect">
@@ -4807,36 +4747,6 @@
               </a14:hiddenFill>
             </a:ext>
           </a:extLst>
-        </p:spPr>
-      </p:pic>
-      <p:pic>
-        <p:nvPicPr>
-          <p:cNvPr id="52" name="Picture 51">
-            <a:extLst>
-              <a:ext uri="{FF2B5EF4-FFF2-40B4-BE49-F238E27FC236}">
-                <a16:creationId xmlns:a16="http://schemas.microsoft.com/office/drawing/2014/main" id="{CD50CE51-367A-9656-90BF-563E2CE94C5D}"/>
-              </a:ext>
-            </a:extLst>
-          </p:cNvPr>
-          <p:cNvPicPr>
-            <a:picLocks noChangeAspect="1"/>
-          </p:cNvPicPr>
-          <p:nvPr/>
-        </p:nvPicPr>
-        <p:blipFill>
-          <a:blip r:embed="rId6"/>
-          <a:stretch>
-            <a:fillRect/>
-          </a:stretch>
-        </p:blipFill>
-        <p:spPr>
-          <a:xfrm>
-            <a:off x="9245456" y="3184384"/>
-            <a:ext cx="448056" cy="578503"/>
-          </a:xfrm>
-          <a:prstGeom prst="rect">
-            <a:avLst/>
-          </a:prstGeom>
         </p:spPr>
       </p:pic>
       <p:pic>
@@ -4869,36 +4779,6 @@
           </a:prstGeom>
         </p:spPr>
       </p:pic>
-      <p:pic>
-        <p:nvPicPr>
-          <p:cNvPr id="54" name="Picture 53">
-            <a:extLst>
-              <a:ext uri="{FF2B5EF4-FFF2-40B4-BE49-F238E27FC236}">
-                <a16:creationId xmlns:a16="http://schemas.microsoft.com/office/drawing/2014/main" id="{EF8BB20B-3E7C-371A-ADC4-43993EF0D8F1}"/>
-              </a:ext>
-            </a:extLst>
-          </p:cNvPr>
-          <p:cNvPicPr>
-            <a:picLocks noChangeAspect="1"/>
-          </p:cNvPicPr>
-          <p:nvPr/>
-        </p:nvPicPr>
-        <p:blipFill>
-          <a:blip r:embed="rId6"/>
-          <a:stretch>
-            <a:fillRect/>
-          </a:stretch>
-        </p:blipFill>
-        <p:spPr>
-          <a:xfrm>
-            <a:off x="9255497" y="5125130"/>
-            <a:ext cx="448056" cy="578503"/>
-          </a:xfrm>
-          <a:prstGeom prst="rect">
-            <a:avLst/>
-          </a:prstGeom>
-        </p:spPr>
-      </p:pic>
       <p:cxnSp>
         <p:nvCxnSpPr>
           <p:cNvPr id="55" name="Straight Arrow Connector 54">
@@ -4915,7 +4795,7 @@
         </p:nvCxnSpPr>
         <p:spPr bwMode="gray">
           <a:xfrm>
-            <a:off x="8406227" y="2661534"/>
+            <a:off x="8411759" y="2551459"/>
             <a:ext cx="858592" cy="1"/>
           </a:xfrm>
           <a:prstGeom prst="straightConnector1">
@@ -4948,7 +4828,6 @@
           <p:cNvCxnSpPr>
             <a:cxnSpLocks/>
             <a:stCxn id="32" idx="3"/>
-            <a:endCxn id="54" idx="1"/>
           </p:cNvCxnSpPr>
           <p:nvPr/>
         </p:nvCxnSpPr>
@@ -4987,13 +4866,12 @@
           <p:cNvCxnSpPr>
             <a:cxnSpLocks/>
             <a:stCxn id="30" idx="3"/>
-            <a:endCxn id="52" idx="1"/>
           </p:cNvCxnSpPr>
           <p:nvPr/>
         </p:nvCxnSpPr>
         <p:spPr bwMode="gray">
           <a:xfrm>
-            <a:off x="8390246" y="3473635"/>
+            <a:off x="8390246" y="3543485"/>
             <a:ext cx="855210" cy="1"/>
           </a:xfrm>
           <a:prstGeom prst="straightConnector1">
@@ -5145,10 +5023,10 @@
       </p:pic>
       <p:pic>
         <p:nvPicPr>
-          <p:cNvPr id="2057" name="Picture 6" descr="FHIR Software and Services for Health IT Companies">
+          <p:cNvPr id="2058" name="Picture 6" descr="FHIR Software and Services for Health IT Companies">
             <a:extLst>
               <a:ext uri="{FF2B5EF4-FFF2-40B4-BE49-F238E27FC236}">
-                <a16:creationId xmlns:a16="http://schemas.microsoft.com/office/drawing/2014/main" id="{78C92F46-2B17-6DEC-5D86-F7D511F34A8E}"/>
+                <a16:creationId xmlns:a16="http://schemas.microsoft.com/office/drawing/2014/main" id="{AEF8AD30-76FE-E5D7-DC78-D2BA5EEE7C73}"/>
               </a:ext>
             </a:extLst>
           </p:cNvPr>
@@ -5170,52 +5048,7 @@
         </p:blipFill>
         <p:spPr bwMode="auto">
           <a:xfrm>
-            <a:off x="7982617" y="1679249"/>
-            <a:ext cx="381277" cy="491577"/>
-          </a:xfrm>
-          <a:prstGeom prst="rect">
-            <a:avLst/>
-          </a:prstGeom>
-          <a:noFill/>
-          <a:extLst>
-            <a:ext uri="{909E8E84-426E-40DD-AFC4-6F175D3DCCD1}">
-              <a14:hiddenFill xmlns:a14="http://schemas.microsoft.com/office/drawing/2010/main">
-                <a:solidFill>
-                  <a:srgbClr val="FFFFFF"/>
-                </a:solidFill>
-              </a14:hiddenFill>
-            </a:ext>
-          </a:extLst>
-        </p:spPr>
-      </p:pic>
-      <p:pic>
-        <p:nvPicPr>
-          <p:cNvPr id="2058" name="Picture 6" descr="FHIR Software and Services for Health IT Companies">
-            <a:extLst>
-              <a:ext uri="{FF2B5EF4-FFF2-40B4-BE49-F238E27FC236}">
-                <a16:creationId xmlns:a16="http://schemas.microsoft.com/office/drawing/2014/main" id="{AEF8AD30-76FE-E5D7-DC78-D2BA5EEE7C73}"/>
-              </a:ext>
-            </a:extLst>
-          </p:cNvPr>
-          <p:cNvPicPr>
-            <a:picLocks noChangeAspect="1" noChangeArrowheads="1"/>
-          </p:cNvPicPr>
-          <p:nvPr/>
-        </p:nvPicPr>
-        <p:blipFill rotWithShape="1">
-          <a:blip r:embed="rId7">
-            <a:extLst>
-              <a:ext uri="{28A0092B-C50C-407E-A947-70E740481C1C}">
-                <a14:useLocalDpi xmlns:a14="http://schemas.microsoft.com/office/drawing/2010/main" val="0"/>
-              </a:ext>
-            </a:extLst>
-          </a:blip>
-          <a:srcRect l="10809" t="31040" r="71205" b="34178"/>
-          <a:stretch/>
-        </p:blipFill>
-        <p:spPr bwMode="auto">
-          <a:xfrm>
-            <a:off x="9260757" y="1679249"/>
+            <a:off x="9235159" y="1866096"/>
             <a:ext cx="381277" cy="491577"/>
           </a:xfrm>
           <a:prstGeom prst="rect">
@@ -6615,7 +6448,7 @@
         </p:blipFill>
         <p:spPr bwMode="auto">
           <a:xfrm>
-            <a:off x="9935596" y="2406985"/>
+            <a:off x="9935596" y="2324435"/>
             <a:ext cx="444674" cy="453942"/>
           </a:xfrm>
           <a:prstGeom prst="rect">
@@ -7025,7 +6858,7 @@
         </p:blipFill>
         <p:spPr bwMode="auto">
           <a:xfrm>
-            <a:off x="9969061" y="1679249"/>
+            <a:off x="9943507" y="1920692"/>
             <a:ext cx="381277" cy="491577"/>
           </a:xfrm>
           <a:prstGeom prst="rect">
@@ -7124,8 +6957,8 @@
         </p:nvSpPr>
         <p:spPr bwMode="gray">
           <a:xfrm>
-            <a:off x="565791" y="6037803"/>
-            <a:ext cx="1590662" cy="365669"/>
+            <a:off x="435916" y="6037803"/>
+            <a:ext cx="1714044" cy="365669"/>
           </a:xfrm>
           <a:prstGeom prst="rightArrow">
             <a:avLst/>
@@ -7326,7 +7159,7 @@
         <p:spPr bwMode="gray">
           <a:xfrm>
             <a:off x="10208844" y="6037803"/>
-            <a:ext cx="1499296" cy="365669"/>
+            <a:ext cx="1616184" cy="365669"/>
           </a:xfrm>
           <a:prstGeom prst="rightArrow">
             <a:avLst/>
@@ -7445,10 +7278,192 @@
           </a:p>
         </p:txBody>
       </p:sp>
+      <p:pic>
+        <p:nvPicPr>
+          <p:cNvPr id="2071" name="Picture 2" descr="Premium Vector | Api technology icon on white vector">
+            <a:extLst>
+              <a:ext uri="{FF2B5EF4-FFF2-40B4-BE49-F238E27FC236}">
+                <a16:creationId xmlns:a16="http://schemas.microsoft.com/office/drawing/2014/main" id="{319BFCC1-865F-28FA-9F65-04EC5EABD877}"/>
+              </a:ext>
+            </a:extLst>
+          </p:cNvPr>
+          <p:cNvPicPr>
+            <a:picLocks noChangeAspect="1" noChangeArrowheads="1"/>
+          </p:cNvPicPr>
+          <p:nvPr/>
+        </p:nvPicPr>
+        <p:blipFill rotWithShape="1">
+          <a:blip r:embed="rId8">
+            <a:extLst>
+              <a:ext uri="{28A0092B-C50C-407E-A947-70E740481C1C}">
+                <a14:useLocalDpi xmlns:a14="http://schemas.microsoft.com/office/drawing/2010/main" val="0"/>
+              </a:ext>
+            </a:extLst>
+          </a:blip>
+          <a:srcRect l="23227" t="23972" r="23758" b="21909"/>
+          <a:stretch/>
+        </p:blipFill>
+        <p:spPr bwMode="auto">
+          <a:xfrm>
+            <a:off x="9947508" y="3334521"/>
+            <a:ext cx="444674" cy="453942"/>
+          </a:xfrm>
+          <a:prstGeom prst="rect">
+            <a:avLst/>
+          </a:prstGeom>
+          <a:noFill/>
+          <a:extLst>
+            <a:ext uri="{909E8E84-426E-40DD-AFC4-6F175D3DCCD1}">
+              <a14:hiddenFill xmlns:a14="http://schemas.microsoft.com/office/drawing/2010/main">
+                <a:solidFill>
+                  <a:srgbClr val="FFFFFF"/>
+                </a:solidFill>
+              </a14:hiddenFill>
+            </a:ext>
+          </a:extLst>
+        </p:spPr>
+      </p:pic>
+      <p:pic>
+        <p:nvPicPr>
+          <p:cNvPr id="2072" name="Picture 6" descr="FHIR Software and Services for Health IT Companies">
+            <a:extLst>
+              <a:ext uri="{FF2B5EF4-FFF2-40B4-BE49-F238E27FC236}">
+                <a16:creationId xmlns:a16="http://schemas.microsoft.com/office/drawing/2014/main" id="{A378492C-54BE-BC42-B651-A8F28CF429DF}"/>
+              </a:ext>
+            </a:extLst>
+          </p:cNvPr>
+          <p:cNvPicPr>
+            <a:picLocks noChangeAspect="1" noChangeArrowheads="1"/>
+          </p:cNvPicPr>
+          <p:nvPr/>
+        </p:nvPicPr>
+        <p:blipFill rotWithShape="1">
+          <a:blip r:embed="rId7">
+            <a:extLst>
+              <a:ext uri="{28A0092B-C50C-407E-A947-70E740481C1C}">
+                <a14:useLocalDpi xmlns:a14="http://schemas.microsoft.com/office/drawing/2010/main" val="0"/>
+              </a:ext>
+            </a:extLst>
+          </a:blip>
+          <a:srcRect l="10809" t="31040" r="71205" b="34178"/>
+          <a:stretch/>
+        </p:blipFill>
+        <p:spPr bwMode="auto">
+          <a:xfrm>
+            <a:off x="9979207" y="2893264"/>
+            <a:ext cx="381277" cy="491577"/>
+          </a:xfrm>
+          <a:prstGeom prst="rect">
+            <a:avLst/>
+          </a:prstGeom>
+          <a:noFill/>
+          <a:extLst>
+            <a:ext uri="{909E8E84-426E-40DD-AFC4-6F175D3DCCD1}">
+              <a14:hiddenFill xmlns:a14="http://schemas.microsoft.com/office/drawing/2010/main">
+                <a:solidFill>
+                  <a:srgbClr val="FFFFFF"/>
+                </a:solidFill>
+              </a14:hiddenFill>
+            </a:ext>
+          </a:extLst>
+        </p:spPr>
+      </p:pic>
+      <p:pic>
+        <p:nvPicPr>
+          <p:cNvPr id="1026" name="Picture 2" descr="Json file - Free interface icons">
+            <a:extLst>
+              <a:ext uri="{FF2B5EF4-FFF2-40B4-BE49-F238E27FC236}">
+                <a16:creationId xmlns:a16="http://schemas.microsoft.com/office/drawing/2014/main" id="{BFCD00BD-3A0E-E77D-96C1-00BE8811DD39}"/>
+              </a:ext>
+            </a:extLst>
+          </p:cNvPr>
+          <p:cNvPicPr>
+            <a:picLocks noChangeAspect="1" noChangeArrowheads="1"/>
+          </p:cNvPicPr>
+          <p:nvPr/>
+        </p:nvPicPr>
+        <p:blipFill>
+          <a:blip r:embed="rId9">
+            <a:extLst>
+              <a:ext uri="{28A0092B-C50C-407E-A947-70E740481C1C}">
+                <a14:useLocalDpi xmlns:a14="http://schemas.microsoft.com/office/drawing/2010/main" val="0"/>
+              </a:ext>
+            </a:extLst>
+          </a:blip>
+          <a:srcRect/>
+          <a:stretch>
+            <a:fillRect/>
+          </a:stretch>
+        </p:blipFill>
+        <p:spPr bwMode="auto">
+          <a:xfrm>
+            <a:off x="9177270" y="3228017"/>
+            <a:ext cx="630936" cy="630936"/>
+          </a:xfrm>
+          <a:prstGeom prst="rect">
+            <a:avLst/>
+          </a:prstGeom>
+          <a:noFill/>
+          <a:extLst>
+            <a:ext uri="{909E8E84-426E-40DD-AFC4-6F175D3DCCD1}">
+              <a14:hiddenFill xmlns:a14="http://schemas.microsoft.com/office/drawing/2010/main">
+                <a:solidFill>
+                  <a:srgbClr val="FFFFFF"/>
+                </a:solidFill>
+              </a14:hiddenFill>
+            </a:ext>
+          </a:extLst>
+        </p:spPr>
+      </p:pic>
+      <p:pic>
+        <p:nvPicPr>
+          <p:cNvPr id="2057" name="Picture 6" descr="FHIR Software and Services for Health IT Companies">
+            <a:extLst>
+              <a:ext uri="{FF2B5EF4-FFF2-40B4-BE49-F238E27FC236}">
+                <a16:creationId xmlns:a16="http://schemas.microsoft.com/office/drawing/2014/main" id="{78C92F46-2B17-6DEC-5D86-F7D511F34A8E}"/>
+              </a:ext>
+            </a:extLst>
+          </p:cNvPr>
+          <p:cNvPicPr>
+            <a:picLocks noChangeAspect="1" noChangeArrowheads="1"/>
+          </p:cNvPicPr>
+          <p:nvPr/>
+        </p:nvPicPr>
+        <p:blipFill rotWithShape="1">
+          <a:blip r:embed="rId7">
+            <a:extLst>
+              <a:ext uri="{28A0092B-C50C-407E-A947-70E740481C1C}">
+                <a14:useLocalDpi xmlns:a14="http://schemas.microsoft.com/office/drawing/2010/main" val="0"/>
+              </a:ext>
+            </a:extLst>
+          </a:blip>
+          <a:srcRect l="10809" t="31040" r="71205" b="34178"/>
+          <a:stretch/>
+        </p:blipFill>
+        <p:spPr bwMode="auto">
+          <a:xfrm>
+            <a:off x="9290094" y="2916645"/>
+            <a:ext cx="381277" cy="491577"/>
+          </a:xfrm>
+          <a:prstGeom prst="rect">
+            <a:avLst/>
+          </a:prstGeom>
+          <a:noFill/>
+          <a:extLst>
+            <a:ext uri="{909E8E84-426E-40DD-AFC4-6F175D3DCCD1}">
+              <a14:hiddenFill xmlns:a14="http://schemas.microsoft.com/office/drawing/2010/main">
+                <a:solidFill>
+                  <a:srgbClr val="FFFFFF"/>
+                </a:solidFill>
+              </a14:hiddenFill>
+            </a:ext>
+          </a:extLst>
+        </p:spPr>
+      </p:pic>
     </p:spTree>
     <p:extLst>
       <p:ext uri="{BB962C8B-B14F-4D97-AF65-F5344CB8AC3E}">
-        <p14:creationId xmlns:p14="http://schemas.microsoft.com/office/powerpoint/2010/main" val="1815959749"/>
+        <p14:creationId xmlns:p14="http://schemas.microsoft.com/office/powerpoint/2010/main" val="2817097351"/>
       </p:ext>
     </p:extLst>
   </p:cSld>

</xml_diff>